<commit_message>
fixed the powerpoint slides
</commit_message>
<xml_diff>
--- a/reports/presentation.pptx
+++ b/reports/presentation.pptx
@@ -3196,11 +3196,6 @@
               <a:t>Slide 9 — Final Test Evaluation (Phase 4)</a:t>
             </a:r>
           </a:p>
-          <a:p>
-            <a:r>
-              <a:t>By Aly</a:t>
-            </a:r>
-          </a:p>
         </p:txBody>
       </p:sp>
       <p:sp>
@@ -3222,49 +3217,49 @@
           <a:p>
             <a:pPr/>
             <a:r>
-              <a:rPr sz="1600"/>
+              <a:rPr sz="1400"/>
               <a:t>Test Results (20% unseen)</a:t>
             </a:r>
           </a:p>
           <a:p>
             <a:pPr lvl="1"/>
             <a:r>
-              <a:rPr sz="1400"/>
+              <a:rPr sz="1200"/>
               <a:t>Accuracy: 93.63%</a:t>
             </a:r>
           </a:p>
           <a:p>
             <a:pPr lvl="1"/>
             <a:r>
-              <a:rPr sz="1400"/>
+              <a:rPr sz="1200"/>
               <a:t>Precision: 63.79%</a:t>
             </a:r>
           </a:p>
           <a:p>
             <a:pPr lvl="1"/>
             <a:r>
-              <a:rPr sz="1400"/>
+              <a:rPr sz="1200"/>
               <a:t>Recall: 73.27%</a:t>
             </a:r>
           </a:p>
           <a:p>
             <a:pPr lvl="1"/>
             <a:r>
-              <a:rPr sz="1400"/>
+              <a:rPr sz="1200"/>
               <a:t>F1: 68.20%</a:t>
             </a:r>
           </a:p>
           <a:p>
             <a:pPr lvl="1"/>
             <a:r>
-              <a:rPr sz="1400"/>
+              <a:rPr sz="1200"/>
               <a:t>ROC-AUC: 96.79%</a:t>
             </a:r>
           </a:p>
           <a:p>
             <a:pPr lvl="1"/>
             <a:r>
-              <a:rPr sz="1400"/>
+              <a:rPr sz="1200"/>
               <a:t>PR-AUC: 79.89%</a:t>
             </a:r>
           </a:p>
@@ -3274,35 +3269,35 @@
           <a:p>
             <a:pPr/>
             <a:r>
-              <a:rPr sz="1600"/>
+              <a:rPr sz="1400"/>
               <a:t>Confusion Matrix</a:t>
             </a:r>
           </a:p>
           <a:p>
             <a:pPr lvl="1"/>
             <a:r>
-              <a:rPr sz="1400"/>
+              <a:rPr sz="1200"/>
               <a:t>TP: 74 — caught fraud</a:t>
             </a:r>
           </a:p>
           <a:p>
             <a:pPr lvl="1"/>
             <a:r>
-              <a:rPr sz="1400"/>
+              <a:rPr sz="1200"/>
               <a:t>FN: 27 — missed fraud</a:t>
             </a:r>
           </a:p>
           <a:p>
             <a:pPr lvl="1"/>
             <a:r>
-              <a:rPr sz="1400"/>
+              <a:rPr sz="1200"/>
               <a:t>FP: 42 — unnecessary audits</a:t>
             </a:r>
           </a:p>
           <a:p>
             <a:pPr lvl="1"/>
             <a:r>
-              <a:rPr sz="1400"/>
+              <a:rPr sz="1200"/>
               <a:t>TN: 940 — legitimate providers</a:t>
             </a:r>
           </a:p>
@@ -3312,7 +3307,7 @@
           <a:p>
             <a:pPr/>
             <a:r>
-              <a:rPr sz="1600"/>
+              <a:rPr sz="1400"/>
               <a:t>➡️ High recall + very high ROC-AUC = excellent fraud ranking</a:t>
             </a:r>
           </a:p>
@@ -3352,15 +3347,10 @@
           <a:lstStyle/>
           <a:p>
             <a:pPr>
-              <a:defRPr sz="3200"/>
+              <a:defRPr sz="2800"/>
             </a:pPr>
             <a:r>
               <a:t>Slide 10 — Business Impact</a:t>
-            </a:r>
-          </a:p>
-          <a:p>
-            <a:r>
-              <a:t>By Mohamed</a:t>
             </a:r>
           </a:p>
         </p:txBody>
@@ -3384,52 +3374,52 @@
           <a:p>
             <a:pPr/>
             <a:r>
-              <a:rPr sz="1800"/>
+              <a:rPr sz="1600"/>
               <a:t>Assumptions:</a:t>
             </a:r>
           </a:p>
           <a:p>
             <a:pPr lvl="1"/>
             <a:r>
+              <a:rPr sz="1400"/>
+              <a:t>False Positive → ~$1,000 audit cost</a:t>
+            </a:r>
+          </a:p>
+          <a:p>
+            <a:pPr lvl="1"/>
+            <a:r>
+              <a:rPr sz="1400"/>
+              <a:t>False Negative → ~$50,000 undetected fraud</a:t>
+            </a:r>
+          </a:p>
+          <a:p>
+            <a:pPr/>
+          </a:p>
+          <a:p>
+            <a:pPr/>
+            <a:r>
               <a:rPr sz="1600"/>
-              <a:t>False Positive → ~$1,000 audit cost</a:t>
-            </a:r>
-          </a:p>
-          <a:p>
-            <a:pPr lvl="1"/>
-            <a:r>
-              <a:rPr sz="1600"/>
-              <a:t>False Negative → ~$50,000 undetected fraud</a:t>
-            </a:r>
-          </a:p>
-          <a:p>
-            <a:pPr/>
-          </a:p>
-          <a:p>
-            <a:pPr/>
-            <a:r>
-              <a:rPr sz="1800"/>
               <a:t>Model advantages:</a:t>
             </a:r>
           </a:p>
           <a:p>
             <a:pPr lvl="1"/>
             <a:r>
-              <a:rPr sz="1600"/>
+              <a:rPr sz="1400"/>
               <a:t>Prevents silent financial leakage</a:t>
             </a:r>
           </a:p>
           <a:p>
             <a:pPr lvl="1"/>
             <a:r>
-              <a:rPr sz="1600"/>
+              <a:rPr sz="1400"/>
               <a:t>Strong ROC-AUC → optimal investigation prioritization</a:t>
             </a:r>
           </a:p>
           <a:p>
             <a:pPr lvl="1"/>
             <a:r>
-              <a:rPr sz="1600"/>
+              <a:rPr sz="1400"/>
               <a:t>Saves operational effort vs random review</a:t>
             </a:r>
           </a:p>
@@ -3469,15 +3459,10 @@
           <a:lstStyle/>
           <a:p>
             <a:pPr>
-              <a:defRPr sz="3200"/>
+              <a:defRPr sz="2800"/>
             </a:pPr>
             <a:r>
               <a:t>Slide 11 — Error Analysis</a:t>
-            </a:r>
-          </a:p>
-          <a:p>
-            <a:r>
-              <a:t>By Bahy</a:t>
             </a:r>
           </a:p>
         </p:txBody>
@@ -3501,69 +3486,69 @@
           <a:p>
             <a:pPr/>
             <a:r>
-              <a:rPr sz="1800"/>
+              <a:rPr sz="1600"/>
               <a:t>False Positives</a:t>
             </a:r>
           </a:p>
           <a:p>
             <a:pPr lvl="1"/>
             <a:r>
+              <a:rPr sz="1400"/>
+              <a:t>Legit high-throughput providers</a:t>
+            </a:r>
+          </a:p>
+          <a:p>
+            <a:pPr lvl="1"/>
+            <a:r>
+              <a:rPr sz="1400"/>
+              <a:t>Resemble "high-revenue fraud"</a:t>
+            </a:r>
+          </a:p>
+          <a:p>
+            <a:pPr/>
+          </a:p>
+          <a:p>
+            <a:pPr/>
+            <a:r>
               <a:rPr sz="1600"/>
-              <a:t>Legit high-throughput providers</a:t>
-            </a:r>
-          </a:p>
-          <a:p>
-            <a:pPr lvl="1"/>
+              <a:t>False Negatives</a:t>
+            </a:r>
+          </a:p>
+          <a:p>
+            <a:pPr lvl="1"/>
+            <a:r>
+              <a:rPr sz="1400"/>
+              <a:t>Very low-volume clinics</a:t>
+            </a:r>
+          </a:p>
+          <a:p>
+            <a:pPr lvl="1"/>
+            <a:r>
+              <a:rPr sz="1400"/>
+              <a:t>Mimic normal small providers</a:t>
+            </a:r>
+          </a:p>
+          <a:p>
+            <a:pPr/>
+          </a:p>
+          <a:p>
+            <a:pPr/>
             <a:r>
               <a:rPr sz="1600"/>
-              <a:t>Resemble "high-revenue fraud"</a:t>
-            </a:r>
-          </a:p>
-          <a:p>
-            <a:pPr/>
-          </a:p>
-          <a:p>
-            <a:pPr/>
-            <a:r>
-              <a:rPr sz="1800"/>
-              <a:t>False Negatives</a:t>
-            </a:r>
-          </a:p>
-          <a:p>
-            <a:pPr lvl="1"/>
-            <a:r>
-              <a:rPr sz="1600"/>
-              <a:t>Very low-volume clinics</a:t>
-            </a:r>
-          </a:p>
-          <a:p>
-            <a:pPr lvl="1"/>
-            <a:r>
-              <a:rPr sz="1600"/>
-              <a:t>Mimic normal small providers</a:t>
-            </a:r>
-          </a:p>
-          <a:p>
-            <a:pPr/>
-          </a:p>
-          <a:p>
-            <a:pPr/>
-            <a:r>
-              <a:rPr sz="1800"/>
               <a:t>Future Enhancements</a:t>
             </a:r>
           </a:p>
           <a:p>
             <a:pPr lvl="1"/>
             <a:r>
-              <a:rPr sz="1600"/>
+              <a:rPr sz="1400"/>
               <a:t>Provider–patient graph relationships</a:t>
             </a:r>
           </a:p>
           <a:p>
             <a:pPr lvl="1"/>
             <a:r>
-              <a:rPr sz="1600"/>
+              <a:rPr sz="1400"/>
               <a:t>Temporal fraud drift tracking</a:t>
             </a:r>
           </a:p>
@@ -3603,15 +3588,10 @@
           <a:lstStyle/>
           <a:p>
             <a:pPr>
-              <a:defRPr sz="3200"/>
+              <a:defRPr sz="2800"/>
             </a:pPr>
             <a:r>
               <a:t>Slide 12 — Key Drivers of Risk</a:t>
-            </a:r>
-          </a:p>
-          <a:p>
-            <a:r>
-              <a:t>By Malak</a:t>
             </a:r>
           </a:p>
         </p:txBody>
@@ -3635,45 +3615,45 @@
           <a:p>
             <a:pPr/>
             <a:r>
-              <a:rPr sz="1800"/>
+              <a:rPr sz="1600"/>
               <a:t>Top influential signals:</a:t>
             </a:r>
           </a:p>
           <a:p>
             <a:pPr lvl="1"/>
             <a:r>
+              <a:rPr sz="1400"/>
+              <a:t>Total claims submitted</a:t>
+            </a:r>
+          </a:p>
+          <a:p>
+            <a:pPr lvl="1"/>
+            <a:r>
+              <a:rPr sz="1400"/>
+              <a:t>Total &amp; avg reimbursement</a:t>
+            </a:r>
+          </a:p>
+          <a:p>
+            <a:pPr lvl="1"/>
+            <a:r>
+              <a:rPr sz="1400"/>
+              <a:t>Diagnosis &amp; procedure diversity</a:t>
+            </a:r>
+          </a:p>
+          <a:p>
+            <a:pPr lvl="1"/>
+            <a:r>
+              <a:rPr sz="1400"/>
+              <a:t>Chronic illness ratios</a:t>
+            </a:r>
+          </a:p>
+          <a:p>
+            <a:pPr/>
+          </a:p>
+          <a:p>
+            <a:pPr/>
+            <a:r>
               <a:rPr sz="1600"/>
-              <a:t>Total claims submitted</a:t>
-            </a:r>
-          </a:p>
-          <a:p>
-            <a:pPr lvl="1"/>
-            <a:r>
-              <a:rPr sz="1600"/>
-              <a:t>Total &amp; avg reimbursement</a:t>
-            </a:r>
-          </a:p>
-          <a:p>
-            <a:pPr lvl="1"/>
-            <a:r>
-              <a:rPr sz="1600"/>
-              <a:t>Diagnosis &amp; procedure diversity</a:t>
-            </a:r>
-          </a:p>
-          <a:p>
-            <a:pPr lvl="1"/>
-            <a:r>
-              <a:rPr sz="1600"/>
-              <a:t>Chronic illness ratios</a:t>
-            </a:r>
-          </a:p>
-          <a:p>
-            <a:pPr/>
-          </a:p>
-          <a:p>
-            <a:pPr/>
-            <a:r>
-              <a:rPr sz="1800"/>
               <a:t>➡️ Features align with known real-world fraud behaviors</a:t>
             </a:r>
           </a:p>
@@ -3719,11 +3699,6 @@
               <a:t>Slide 13 — Final Recommendations</a:t>
             </a:r>
           </a:p>
-          <a:p>
-            <a:r>
-              <a:t>By Mohamed</a:t>
-            </a:r>
-          </a:p>
         </p:txBody>
       </p:sp>
       <p:sp>
@@ -3745,28 +3720,28 @@
           <a:p>
             <a:pPr/>
             <a:r>
-              <a:rPr sz="2000"/>
+              <a:rPr sz="1800"/>
               <a:t>Deploy XGBoost for Medicare fraud triage</a:t>
             </a:r>
           </a:p>
           <a:p>
             <a:pPr/>
             <a:r>
-              <a:rPr sz="2000"/>
+              <a:rPr sz="1800"/>
               <a:t>Investigate top risk percentile providers</a:t>
             </a:r>
           </a:p>
           <a:p>
             <a:pPr/>
             <a:r>
-              <a:rPr sz="2000"/>
+              <a:rPr sz="1800"/>
               <a:t>Keep human analysts in loop</a:t>
             </a:r>
           </a:p>
           <a:p>
             <a:pPr/>
             <a:r>
-              <a:rPr sz="2000"/>
+              <a:rPr sz="1800"/>
               <a:t>Retrain every quarter → prevent drift</a:t>
             </a:r>
           </a:p>
@@ -3871,7 +3846,7 @@
           <a:lstStyle/>
           <a:p>
             <a:pPr>
-              <a:defRPr sz="3200"/>
+              <a:defRPr sz="2800"/>
             </a:pPr>
             <a:r>
               <a:t>Slide 1 — The Problem &amp; Our Objective</a:t>
@@ -3903,21 +3878,21 @@
           <a:p>
             <a:pPr/>
             <a:r>
-              <a:rPr sz="1800"/>
+              <a:rPr sz="1600"/>
               <a:t>US healthcare fraud exceeds $68B/year</a:t>
             </a:r>
           </a:p>
           <a:p>
             <a:pPr/>
             <a:r>
-              <a:rPr sz="1800"/>
+              <a:rPr sz="1600"/>
               <a:t>Legacy auditing misses hidden fraud patterns</a:t>
             </a:r>
           </a:p>
           <a:p>
             <a:pPr/>
             <a:r>
-              <a:rPr sz="1800"/>
+              <a:rPr sz="1600"/>
               <a:t>Fraudulent providers ≈ 9% → ML bias</a:t>
             </a:r>
           </a:p>
@@ -3927,28 +3902,28 @@
           <a:p>
             <a:pPr/>
             <a:r>
-              <a:rPr sz="1800"/>
+              <a:rPr sz="1600"/>
               <a:t>Goal</a:t>
             </a:r>
           </a:p>
           <a:p>
             <a:pPr lvl="1"/>
             <a:r>
-              <a:rPr sz="1600"/>
+              <a:rPr sz="1400"/>
               <a:t>Detect high-risk providers (not individual claims)</a:t>
             </a:r>
           </a:p>
           <a:p>
             <a:pPr lvl="1"/>
             <a:r>
-              <a:rPr sz="1600"/>
+              <a:rPr sz="1400"/>
               <a:t>Handle severe class imbalance</a:t>
             </a:r>
           </a:p>
           <a:p>
             <a:pPr lvl="1"/>
             <a:r>
-              <a:rPr sz="1600"/>
+              <a:rPr sz="1400"/>
               <a:t>Reduce false investigations &amp; financial loss</a:t>
             </a:r>
           </a:p>
@@ -3994,11 +3969,6 @@
               <a:t>Slide 2 — Data Architecture Overview (Phase 1)</a:t>
             </a:r>
           </a:p>
-          <a:p>
-            <a:r>
-              <a:t>By Malak</a:t>
-            </a:r>
-          </a:p>
         </p:txBody>
       </p:sp>
       <p:sp>
@@ -4020,93 +3990,93 @@
           <a:p>
             <a:pPr/>
             <a:r>
-              <a:rPr sz="1800"/>
+              <a:rPr sz="1600"/>
               <a:t>Inputs</a:t>
             </a:r>
           </a:p>
           <a:p>
             <a:pPr lvl="1"/>
             <a:r>
+              <a:rPr sz="1400"/>
+              <a:t>Beneficiary</a:t>
+            </a:r>
+          </a:p>
+          <a:p>
+            <a:pPr lvl="1"/>
+            <a:r>
+              <a:rPr sz="1400"/>
+              <a:t>Inpatient</a:t>
+            </a:r>
+          </a:p>
+          <a:p>
+            <a:pPr lvl="1"/>
+            <a:r>
+              <a:rPr sz="1400"/>
+              <a:t>Outpatient</a:t>
+            </a:r>
+          </a:p>
+          <a:p>
+            <a:pPr lvl="1"/>
+            <a:r>
+              <a:rPr sz="1400"/>
+              <a:t>Provider labels</a:t>
+            </a:r>
+          </a:p>
+          <a:p>
+            <a:pPr/>
+          </a:p>
+          <a:p>
+            <a:pPr/>
+            <a:r>
               <a:rPr sz="1600"/>
-              <a:t>Beneficiary</a:t>
-            </a:r>
-          </a:p>
-          <a:p>
-            <a:pPr lvl="1"/>
+              <a:t>Join Level</a:t>
+            </a:r>
+          </a:p>
+          <a:p>
+            <a:pPr lvl="1"/>
+            <a:r>
+              <a:rPr sz="1400"/>
+              <a:t>BeneID → Patient Events</a:t>
+            </a:r>
+          </a:p>
+          <a:p>
+            <a:pPr lvl="1"/>
+            <a:r>
+              <a:rPr sz="1400"/>
+              <a:t>Provider → Target Entity (Fraud label)</a:t>
+            </a:r>
+          </a:p>
+          <a:p>
+            <a:pPr/>
+          </a:p>
+          <a:p>
+            <a:pPr/>
             <a:r>
               <a:rPr sz="1600"/>
-              <a:t>Inpatient</a:t>
-            </a:r>
-          </a:p>
-          <a:p>
-            <a:pPr lvl="1"/>
+              <a:t>Challenge</a:t>
+            </a:r>
+          </a:p>
+          <a:p>
+            <a:pPr lvl="1"/>
+            <a:r>
+              <a:rPr sz="1400"/>
+              <a:t>Claims are transactional</a:t>
+            </a:r>
+          </a:p>
+          <a:p>
+            <a:pPr lvl="1"/>
+            <a:r>
+              <a:rPr sz="1400"/>
+              <a:t>Fraud is behavioral at provider level</a:t>
+            </a:r>
+          </a:p>
+          <a:p>
+            <a:pPr/>
+          </a:p>
+          <a:p>
+            <a:pPr/>
             <a:r>
               <a:rPr sz="1600"/>
-              <a:t>Outpatient</a:t>
-            </a:r>
-          </a:p>
-          <a:p>
-            <a:pPr lvl="1"/>
-            <a:r>
-              <a:rPr sz="1600"/>
-              <a:t>Provider labels</a:t>
-            </a:r>
-          </a:p>
-          <a:p>
-            <a:pPr/>
-          </a:p>
-          <a:p>
-            <a:pPr/>
-            <a:r>
-              <a:rPr sz="1800"/>
-              <a:t>Join Level</a:t>
-            </a:r>
-          </a:p>
-          <a:p>
-            <a:pPr lvl="1"/>
-            <a:r>
-              <a:rPr sz="1600"/>
-              <a:t>BeneID → Patient Events</a:t>
-            </a:r>
-          </a:p>
-          <a:p>
-            <a:pPr lvl="1"/>
-            <a:r>
-              <a:rPr sz="1600"/>
-              <a:t>Provider → Target Entity (Fraud label)</a:t>
-            </a:r>
-          </a:p>
-          <a:p>
-            <a:pPr/>
-          </a:p>
-          <a:p>
-            <a:pPr/>
-            <a:r>
-              <a:rPr sz="1800"/>
-              <a:t>Challenge</a:t>
-            </a:r>
-          </a:p>
-          <a:p>
-            <a:pPr lvl="1"/>
-            <a:r>
-              <a:rPr sz="1600"/>
-              <a:t>Claims are transactional</a:t>
-            </a:r>
-          </a:p>
-          <a:p>
-            <a:pPr lvl="1"/>
-            <a:r>
-              <a:rPr sz="1600"/>
-              <a:t>Fraud is behavioral at provider level</a:t>
-            </a:r>
-          </a:p>
-          <a:p>
-            <a:pPr/>
-          </a:p>
-          <a:p>
-            <a:pPr/>
-            <a:r>
-              <a:rPr sz="1800"/>
               <a:t>➡️ Build provider-level profiles</a:t>
             </a:r>
           </a:p>
@@ -4146,15 +4116,10 @@
           <a:lstStyle/>
           <a:p>
             <a:pPr>
-              <a:defRPr sz="3200"/>
+              <a:defRPr sz="2800"/>
             </a:pPr>
             <a:r>
               <a:t>Slide 3 — Data Cleaning Strategy</a:t>
-            </a:r>
-          </a:p>
-          <a:p>
-            <a:r>
-              <a:t>By Malak</a:t>
             </a:r>
           </a:p>
         </p:txBody>
@@ -4178,76 +4143,76 @@
           <a:p>
             <a:pPr/>
             <a:r>
-              <a:rPr sz="1800"/>
+              <a:rPr sz="1600"/>
               <a:t>Problems Detected</a:t>
             </a:r>
           </a:p>
           <a:p>
             <a:pPr lvl="1"/>
             <a:r>
+              <a:rPr sz="1400"/>
+              <a:t>Missing physician codes</a:t>
+            </a:r>
+          </a:p>
+          <a:p>
+            <a:pPr lvl="1"/>
+            <a:r>
+              <a:rPr sz="1400"/>
+              <a:t>Nonsensical claim durations</a:t>
+            </a:r>
+          </a:p>
+          <a:p>
+            <a:pPr lvl="1"/>
+            <a:r>
+              <a:rPr sz="1400"/>
+              <a:t>Zero-information columns</a:t>
+            </a:r>
+          </a:p>
+          <a:p>
+            <a:pPr/>
+          </a:p>
+          <a:p>
+            <a:pPr/>
+            <a:r>
               <a:rPr sz="1600"/>
-              <a:t>Missing physician codes</a:t>
-            </a:r>
-          </a:p>
-          <a:p>
-            <a:pPr lvl="1"/>
+              <a:t>Actions</a:t>
+            </a:r>
+          </a:p>
+          <a:p>
+            <a:pPr lvl="1"/>
+            <a:r>
+              <a:rPr sz="1400"/>
+              <a:t>Encode missing physicians as "Unknown"</a:t>
+            </a:r>
+          </a:p>
+          <a:p>
+            <a:pPr lvl="1"/>
+            <a:r>
+              <a:rPr sz="1400"/>
+              <a:t>Drop invalid-duration claims</a:t>
+            </a:r>
+          </a:p>
+          <a:p>
+            <a:pPr lvl="1"/>
+            <a:r>
+              <a:rPr sz="1400"/>
+              <a:t>Remove redundant fields</a:t>
+            </a:r>
+          </a:p>
+          <a:p>
+            <a:pPr/>
+          </a:p>
+          <a:p>
+            <a:pPr/>
             <a:r>
               <a:rPr sz="1600"/>
-              <a:t>Nonsensical claim durations</a:t>
-            </a:r>
-          </a:p>
-          <a:p>
-            <a:pPr lvl="1"/>
-            <a:r>
-              <a:rPr sz="1600"/>
-              <a:t>Zero-information columns</a:t>
-            </a:r>
-          </a:p>
-          <a:p>
-            <a:pPr/>
-          </a:p>
-          <a:p>
-            <a:pPr/>
-            <a:r>
-              <a:rPr sz="1800"/>
-              <a:t>Actions</a:t>
-            </a:r>
-          </a:p>
-          <a:p>
-            <a:pPr lvl="1"/>
-            <a:r>
-              <a:rPr sz="1600"/>
-              <a:t>Encode missing physicians as "Unknown"</a:t>
-            </a:r>
-          </a:p>
-          <a:p>
-            <a:pPr lvl="1"/>
-            <a:r>
-              <a:rPr sz="1600"/>
-              <a:t>Drop invalid-duration claims</a:t>
-            </a:r>
-          </a:p>
-          <a:p>
-            <a:pPr lvl="1"/>
-            <a:r>
-              <a:rPr sz="1600"/>
-              <a:t>Remove redundant fields</a:t>
-            </a:r>
-          </a:p>
-          <a:p>
-            <a:pPr/>
-          </a:p>
-          <a:p>
-            <a:pPr/>
-            <a:r>
-              <a:rPr sz="1800"/>
               <a:t>Outcome</a:t>
             </a:r>
           </a:p>
           <a:p>
             <a:pPr lvl="1"/>
             <a:r>
-              <a:rPr sz="1600"/>
+              <a:rPr sz="1400"/>
               <a:t>Fraud distribution confirmed at ~9–10%</a:t>
             </a:r>
           </a:p>
@@ -4287,15 +4252,10 @@
           <a:lstStyle/>
           <a:p>
             <a:pPr>
-              <a:defRPr sz="3200"/>
+              <a:defRPr sz="2800"/>
             </a:pPr>
             <a:r>
               <a:t>Slide 4 — Feature Engineering</a:t>
-            </a:r>
-          </a:p>
-          <a:p>
-            <a:r>
-              <a:t>By Mohamed</a:t>
             </a:r>
           </a:p>
         </p:txBody>
@@ -4319,7 +4279,7 @@
           <a:p>
             <a:pPr/>
             <a:r>
-              <a:rPr sz="1800"/>
+              <a:rPr sz="1600"/>
               <a:t>We convert millions of claims → provider behavioral vectors</a:t>
             </a:r>
           </a:p>
@@ -4329,45 +4289,45 @@
           <a:p>
             <a:pPr/>
             <a:r>
-              <a:rPr sz="1800"/>
+              <a:rPr sz="1600"/>
               <a:t>Feature Groups</a:t>
             </a:r>
           </a:p>
           <a:p>
             <a:pPr lvl="1"/>
             <a:r>
+              <a:rPr sz="1400"/>
+              <a:t>Financial: reimbursements, avg deductible, mean claim cost</a:t>
+            </a:r>
+          </a:p>
+          <a:p>
+            <a:pPr lvl="1"/>
+            <a:r>
+              <a:rPr sz="1400"/>
+              <a:t>Operational: volume, inpatient/outpatient balance</a:t>
+            </a:r>
+          </a:p>
+          <a:p>
+            <a:pPr lvl="1"/>
+            <a:r>
+              <a:rPr sz="1400"/>
+              <a:t>Service Diversity: unique diagnoses &amp; procedures</a:t>
+            </a:r>
+          </a:p>
+          <a:p>
+            <a:pPr lvl="1"/>
+            <a:r>
+              <a:rPr sz="1400"/>
+              <a:t>Patient mix: chronic ratios, unique patient count</a:t>
+            </a:r>
+          </a:p>
+          <a:p>
+            <a:pPr/>
+          </a:p>
+          <a:p>
+            <a:pPr/>
+            <a:r>
               <a:rPr sz="1600"/>
-              <a:t>Financial: reimbursements, avg deductible, mean claim cost</a:t>
-            </a:r>
-          </a:p>
-          <a:p>
-            <a:pPr lvl="1"/>
-            <a:r>
-              <a:rPr sz="1600"/>
-              <a:t>Operational: volume, inpatient/outpatient balance</a:t>
-            </a:r>
-          </a:p>
-          <a:p>
-            <a:pPr lvl="1"/>
-            <a:r>
-              <a:rPr sz="1600"/>
-              <a:t>Service Diversity: unique diagnoses &amp; procedures</a:t>
-            </a:r>
-          </a:p>
-          <a:p>
-            <a:pPr lvl="1"/>
-            <a:r>
-              <a:rPr sz="1600"/>
-              <a:t>Patient mix: chronic ratios, unique patient count</a:t>
-            </a:r>
-          </a:p>
-          <a:p>
-            <a:pPr/>
-          </a:p>
-          <a:p>
-            <a:pPr/>
-            <a:r>
-              <a:rPr sz="1800"/>
               <a:t>Final Dataset: 5410 providers × ~134 features</a:t>
             </a:r>
           </a:p>
@@ -4407,15 +4367,10 @@
           <a:lstStyle/>
           <a:p>
             <a:pPr>
-              <a:defRPr sz="3200"/>
+              <a:defRPr sz="2800"/>
             </a:pPr>
             <a:r>
               <a:t>Slide 5 — Exploratory Insights</a:t>
-            </a:r>
-          </a:p>
-          <a:p>
-            <a:r>
-              <a:t>By Mohamed</a:t>
             </a:r>
           </a:p>
         </p:txBody>
@@ -4439,35 +4394,35 @@
           <a:p>
             <a:pPr/>
             <a:r>
-              <a:rPr sz="1800"/>
+              <a:rPr sz="1600"/>
               <a:t>Detected patterns:</a:t>
             </a:r>
           </a:p>
           <a:p>
             <a:pPr lvl="1"/>
             <a:r>
-              <a:rPr sz="1600"/>
+              <a:rPr sz="1400"/>
               <a:t>Fraud providers show higher revenue throughput</a:t>
             </a:r>
           </a:p>
           <a:p>
             <a:pPr lvl="1"/>
             <a:r>
-              <a:rPr sz="1600"/>
+              <a:rPr sz="1400"/>
               <a:t>Greater diagnosis/procedure diversity</a:t>
             </a:r>
           </a:p>
           <a:p>
             <a:pPr lvl="1"/>
             <a:r>
-              <a:rPr sz="1600"/>
+              <a:rPr sz="1400"/>
               <a:t>Geographic hotspots (certain states)</a:t>
             </a:r>
           </a:p>
           <a:p>
             <a:pPr lvl="1"/>
             <a:r>
-              <a:rPr sz="1600"/>
+              <a:rPr sz="1400"/>
               <a:t>Sustained high billing across time → not random</a:t>
             </a:r>
           </a:p>
@@ -4513,11 +4468,6 @@
               <a:t>Slide 6 — Handling Imbalance (Phase 2)</a:t>
             </a:r>
           </a:p>
-          <a:p>
-            <a:r>
-              <a:t>By Bahy</a:t>
-            </a:r>
-          </a:p>
         </p:txBody>
       </p:sp>
       <p:sp>
@@ -4539,7 +4489,7 @@
           <a:p>
             <a:pPr/>
             <a:r>
-              <a:rPr sz="1800"/>
+              <a:rPr sz="1600"/>
               <a:t>Issue: Fraud = minority → models default to "No Fraud"</a:t>
             </a:r>
           </a:p>
@@ -4549,52 +4499,52 @@
           <a:p>
             <a:pPr/>
             <a:r>
-              <a:rPr sz="1800"/>
+              <a:rPr sz="1600"/>
               <a:t>Methods tested:</a:t>
             </a:r>
           </a:p>
           <a:p>
             <a:pPr lvl="1"/>
             <a:r>
+              <a:rPr sz="1400"/>
+              <a:t>Class Weighting</a:t>
+            </a:r>
+          </a:p>
+          <a:p>
+            <a:pPr lvl="1"/>
+            <a:r>
+              <a:rPr sz="1400"/>
+              <a:t>SMOTE</a:t>
+            </a:r>
+          </a:p>
+          <a:p>
+            <a:pPr lvl="1"/>
+            <a:r>
+              <a:rPr sz="1400"/>
+              <a:t>SMOTE + Tomek Links</a:t>
+            </a:r>
+          </a:p>
+          <a:p>
+            <a:pPr/>
+          </a:p>
+          <a:p>
+            <a:pPr/>
+            <a:r>
               <a:rPr sz="1600"/>
-              <a:t>Class Weighting</a:t>
-            </a:r>
-          </a:p>
-          <a:p>
-            <a:pPr lvl="1"/>
-            <a:r>
-              <a:rPr sz="1600"/>
-              <a:t>SMOTE</a:t>
-            </a:r>
-          </a:p>
-          <a:p>
-            <a:pPr lvl="1"/>
-            <a:r>
-              <a:rPr sz="1600"/>
-              <a:t>SMOTE + Tomek Links</a:t>
-            </a:r>
-          </a:p>
-          <a:p>
-            <a:pPr/>
-          </a:p>
-          <a:p>
-            <a:pPr/>
-            <a:r>
-              <a:rPr sz="1800"/>
               <a:t>Purpose:</a:t>
             </a:r>
           </a:p>
           <a:p>
             <a:pPr lvl="1"/>
             <a:r>
-              <a:rPr sz="1600"/>
+              <a:rPr sz="1400"/>
               <a:t>Improve detection power</a:t>
             </a:r>
           </a:p>
           <a:p>
             <a:pPr lvl="1"/>
             <a:r>
-              <a:rPr sz="1600"/>
+              <a:rPr sz="1400"/>
               <a:t>Preserve real distributions after oversampling</a:t>
             </a:r>
           </a:p>
@@ -4640,11 +4590,6 @@
               <a:t>Slide 7 — Modeling Strategy (Phase 3)</a:t>
             </a:r>
           </a:p>
-          <a:p>
-            <a:r>
-              <a:t>By Bahy</a:t>
-            </a:r>
-          </a:p>
         </p:txBody>
       </p:sp>
       <p:sp>
@@ -4666,59 +4611,59 @@
           <a:p>
             <a:pPr/>
             <a:r>
-              <a:rPr sz="1800"/>
+              <a:rPr sz="1600"/>
               <a:t>Models:</a:t>
             </a:r>
           </a:p>
           <a:p>
             <a:pPr lvl="1"/>
             <a:r>
+              <a:rPr sz="1400"/>
+              <a:t>Logistic Regression → interpretable baseline</a:t>
+            </a:r>
+          </a:p>
+          <a:p>
+            <a:pPr lvl="1"/>
+            <a:r>
+              <a:rPr sz="1400"/>
+              <a:t>Decision Tree → simple benchmark</a:t>
+            </a:r>
+          </a:p>
+          <a:p>
+            <a:pPr lvl="1"/>
+            <a:r>
+              <a:rPr sz="1400"/>
+              <a:t>Random Forest → robust ensemble</a:t>
+            </a:r>
+          </a:p>
+          <a:p>
+            <a:pPr lvl="1"/>
+            <a:r>
+              <a:rPr sz="1400"/>
+              <a:t>XGBoost → non-linear excellence + imbalance tolerance</a:t>
+            </a:r>
+          </a:p>
+          <a:p>
+            <a:pPr/>
+          </a:p>
+          <a:p>
+            <a:pPr/>
+            <a:r>
               <a:rPr sz="1600"/>
-              <a:t>Logistic Regression → interpretable baseline</a:t>
-            </a:r>
-          </a:p>
-          <a:p>
-            <a:pPr lvl="1"/>
-            <a:r>
-              <a:rPr sz="1600"/>
-              <a:t>Decision Tree → simple benchmark</a:t>
-            </a:r>
-          </a:p>
-          <a:p>
-            <a:pPr lvl="1"/>
-            <a:r>
-              <a:rPr sz="1600"/>
-              <a:t>Random Forest → robust ensemble</a:t>
-            </a:r>
-          </a:p>
-          <a:p>
-            <a:pPr lvl="1"/>
-            <a:r>
-              <a:rPr sz="1600"/>
-              <a:t>XGBoost → non-linear excellence + imbalance tolerance</a:t>
-            </a:r>
-          </a:p>
-          <a:p>
-            <a:pPr/>
-          </a:p>
-          <a:p>
-            <a:pPr/>
-            <a:r>
-              <a:rPr sz="1800"/>
               <a:t>Tuning</a:t>
             </a:r>
           </a:p>
           <a:p>
             <a:pPr lvl="1"/>
             <a:r>
-              <a:rPr sz="1600"/>
+              <a:rPr sz="1400"/>
               <a:t>GridSearchCV (5-fold)</a:t>
             </a:r>
           </a:p>
           <a:p>
             <a:pPr lvl="1"/>
             <a:r>
-              <a:rPr sz="1600"/>
+              <a:rPr sz="1400"/>
               <a:t>Optimized for F1 score</a:t>
             </a:r>
           </a:p>
@@ -4764,11 +4709,6 @@
               <a:t>Slide 8 — Model Selection Results</a:t>
             </a:r>
           </a:p>
-          <a:p>
-            <a:r>
-              <a:t>By Mohamed</a:t>
-            </a:r>
-          </a:p>
         </p:txBody>
       </p:sp>
       <p:sp>
@@ -4790,7 +4730,7 @@
           <a:p>
             <a:pPr/>
             <a:r>
-              <a:rPr sz="1600"/>
+              <a:rPr sz="1400"/>
               <a:t>Model Comparison (Validation Set):</a:t>
             </a:r>
           </a:p>
@@ -4800,28 +4740,28 @@
           <a:p>
             <a:pPr/>
             <a:r>
-              <a:rPr sz="1600"/>
+              <a:rPr sz="1400"/>
               <a:t>Logistic Regression: Precision 0.43, Recall 0.80, F1 0.56, PR-AUC 0.63</a:t>
             </a:r>
           </a:p>
           <a:p>
             <a:pPr/>
             <a:r>
-              <a:rPr sz="1600"/>
+              <a:rPr sz="1400"/>
               <a:t>Random Forest: Precision 0.48, Recall 0.77, F1 0.59, PR-AUC 0.59</a:t>
             </a:r>
           </a:p>
           <a:p>
             <a:pPr/>
             <a:r>
-              <a:rPr sz="1600"/>
+              <a:rPr sz="1400"/>
               <a:t>Decision Tree: Precision 0.43, Recall 0.68, F1 0.53, PR-AUC 0.37</a:t>
             </a:r>
           </a:p>
           <a:p>
             <a:pPr/>
             <a:r>
-              <a:rPr sz="1600"/>
+              <a:rPr sz="1400"/>
               <a:t>XGBoost: Precision 0.59, Recall 0.68, F1 0.63, PR-AUC 0.65</a:t>
             </a:r>
           </a:p>
@@ -4831,7 +4771,7 @@
           <a:p>
             <a:pPr/>
             <a:r>
-              <a:rPr sz="1600"/>
+              <a:rPr sz="1400"/>
               <a:t>XGBoost = best balance: recall + precision + ROC-AUC</a:t>
             </a:r>
           </a:p>

</xml_diff>

<commit_message>
fixed a slide in the powerpoint
</commit_message>
<xml_diff>
--- a/reports/presentation.pptx
+++ b/reports/presentation.pptx
@@ -3196,6 +3196,11 @@
               <a:t>Slide 9 — Final Test Evaluation (Phase 4)</a:t>
             </a:r>
           </a:p>
+          <a:p>
+            <a:r>
+              <a:t>By Aly</a:t>
+            </a:r>
+          </a:p>
         </p:txBody>
       </p:sp>
       <p:sp>
@@ -3217,49 +3222,49 @@
           <a:p>
             <a:pPr/>
             <a:r>
+              <a:rPr sz="1600"/>
+              <a:t>Test Results (20% unseen)</a:t>
+            </a:r>
+          </a:p>
+          <a:p>
+            <a:pPr lvl="1"/>
+            <a:r>
               <a:rPr sz="1400"/>
-              <a:t>Test Results (20% unseen)</a:t>
-            </a:r>
-          </a:p>
-          <a:p>
-            <a:pPr lvl="1"/>
-            <a:r>
-              <a:rPr sz="1200"/>
               <a:t>Accuracy: 93.63%</a:t>
             </a:r>
           </a:p>
           <a:p>
             <a:pPr lvl="1"/>
             <a:r>
-              <a:rPr sz="1200"/>
+              <a:rPr sz="1400"/>
               <a:t>Precision: 63.79%</a:t>
             </a:r>
           </a:p>
           <a:p>
             <a:pPr lvl="1"/>
             <a:r>
-              <a:rPr sz="1200"/>
+              <a:rPr sz="1400"/>
               <a:t>Recall: 73.27%</a:t>
             </a:r>
           </a:p>
           <a:p>
             <a:pPr lvl="1"/>
             <a:r>
-              <a:rPr sz="1200"/>
+              <a:rPr sz="1400"/>
               <a:t>F1: 68.20%</a:t>
             </a:r>
           </a:p>
           <a:p>
             <a:pPr lvl="1"/>
             <a:r>
-              <a:rPr sz="1200"/>
+              <a:rPr sz="1400"/>
               <a:t>ROC-AUC: 96.79%</a:t>
             </a:r>
           </a:p>
           <a:p>
             <a:pPr lvl="1"/>
             <a:r>
-              <a:rPr sz="1200"/>
+              <a:rPr sz="1400"/>
               <a:t>PR-AUC: 79.89%</a:t>
             </a:r>
           </a:p>
@@ -3269,35 +3274,35 @@
           <a:p>
             <a:pPr/>
             <a:r>
+              <a:rPr sz="1600"/>
+              <a:t>Confusion Matrix</a:t>
+            </a:r>
+          </a:p>
+          <a:p>
+            <a:pPr lvl="1"/>
+            <a:r>
               <a:rPr sz="1400"/>
-              <a:t>Confusion Matrix</a:t>
-            </a:r>
-          </a:p>
-          <a:p>
-            <a:pPr lvl="1"/>
-            <a:r>
-              <a:rPr sz="1200"/>
               <a:t>TP: 74 — caught fraud</a:t>
             </a:r>
           </a:p>
           <a:p>
             <a:pPr lvl="1"/>
             <a:r>
-              <a:rPr sz="1200"/>
+              <a:rPr sz="1400"/>
               <a:t>FN: 27 — missed fraud</a:t>
             </a:r>
           </a:p>
           <a:p>
             <a:pPr lvl="1"/>
             <a:r>
-              <a:rPr sz="1200"/>
+              <a:rPr sz="1400"/>
               <a:t>FP: 42 — unnecessary audits</a:t>
             </a:r>
           </a:p>
           <a:p>
             <a:pPr lvl="1"/>
             <a:r>
-              <a:rPr sz="1200"/>
+              <a:rPr sz="1400"/>
               <a:t>TN: 940 — legitimate providers</a:t>
             </a:r>
           </a:p>
@@ -3307,7 +3312,7 @@
           <a:p>
             <a:pPr/>
             <a:r>
-              <a:rPr sz="1400"/>
+              <a:rPr sz="1600"/>
               <a:t>➡️ High recall + very high ROC-AUC = excellent fraud ranking</a:t>
             </a:r>
           </a:p>
@@ -3347,10 +3352,15 @@
           <a:lstStyle/>
           <a:p>
             <a:pPr>
-              <a:defRPr sz="2800"/>
+              <a:defRPr sz="3200"/>
             </a:pPr>
             <a:r>
               <a:t>Slide 10 — Business Impact</a:t>
+            </a:r>
+          </a:p>
+          <a:p>
+            <a:r>
+              <a:t>By Mohamed</a:t>
             </a:r>
           </a:p>
         </p:txBody>
@@ -3374,21 +3384,21 @@
           <a:p>
             <a:pPr/>
             <a:r>
-              <a:rPr sz="1600"/>
+              <a:rPr sz="1800"/>
               <a:t>Assumptions:</a:t>
             </a:r>
           </a:p>
           <a:p>
             <a:pPr lvl="1"/>
             <a:r>
-              <a:rPr sz="1400"/>
+              <a:rPr sz="1600"/>
               <a:t>False Positive → ~$1,000 audit cost</a:t>
             </a:r>
           </a:p>
           <a:p>
             <a:pPr lvl="1"/>
             <a:r>
-              <a:rPr sz="1400"/>
+              <a:rPr sz="1600"/>
               <a:t>False Negative → ~$50,000 undetected fraud</a:t>
             </a:r>
           </a:p>
@@ -3398,28 +3408,28 @@
           <a:p>
             <a:pPr/>
             <a:r>
-              <a:rPr sz="1600"/>
+              <a:rPr sz="1800"/>
               <a:t>Model advantages:</a:t>
             </a:r>
           </a:p>
           <a:p>
             <a:pPr lvl="1"/>
             <a:r>
-              <a:rPr sz="1400"/>
+              <a:rPr sz="1600"/>
               <a:t>Prevents silent financial leakage</a:t>
             </a:r>
           </a:p>
           <a:p>
             <a:pPr lvl="1"/>
             <a:r>
-              <a:rPr sz="1400"/>
+              <a:rPr sz="1600"/>
               <a:t>Strong ROC-AUC → optimal investigation prioritization</a:t>
             </a:r>
           </a:p>
           <a:p>
             <a:pPr lvl="1"/>
             <a:r>
-              <a:rPr sz="1400"/>
+              <a:rPr sz="1600"/>
               <a:t>Saves operational effort vs random review</a:t>
             </a:r>
           </a:p>
@@ -3459,10 +3469,15 @@
           <a:lstStyle/>
           <a:p>
             <a:pPr>
-              <a:defRPr sz="2800"/>
+              <a:defRPr sz="3200"/>
             </a:pPr>
             <a:r>
               <a:t>Slide 11 — Error Analysis</a:t>
+            </a:r>
+          </a:p>
+          <a:p>
+            <a:r>
+              <a:t>By Bahy</a:t>
             </a:r>
           </a:p>
         </p:txBody>
@@ -3486,21 +3501,21 @@
           <a:p>
             <a:pPr/>
             <a:r>
-              <a:rPr sz="1600"/>
+              <a:rPr sz="1800"/>
               <a:t>False Positives</a:t>
             </a:r>
           </a:p>
           <a:p>
             <a:pPr lvl="1"/>
             <a:r>
-              <a:rPr sz="1400"/>
+              <a:rPr sz="1600"/>
               <a:t>Legit high-throughput providers</a:t>
             </a:r>
           </a:p>
           <a:p>
             <a:pPr lvl="1"/>
             <a:r>
-              <a:rPr sz="1400"/>
+              <a:rPr sz="1600"/>
               <a:t>Resemble "high-revenue fraud"</a:t>
             </a:r>
           </a:p>
@@ -3510,21 +3525,21 @@
           <a:p>
             <a:pPr/>
             <a:r>
-              <a:rPr sz="1600"/>
+              <a:rPr sz="1800"/>
               <a:t>False Negatives</a:t>
             </a:r>
           </a:p>
           <a:p>
             <a:pPr lvl="1"/>
             <a:r>
-              <a:rPr sz="1400"/>
+              <a:rPr sz="1600"/>
               <a:t>Very low-volume clinics</a:t>
             </a:r>
           </a:p>
           <a:p>
             <a:pPr lvl="1"/>
             <a:r>
-              <a:rPr sz="1400"/>
+              <a:rPr sz="1600"/>
               <a:t>Mimic normal small providers</a:t>
             </a:r>
           </a:p>
@@ -3534,21 +3549,21 @@
           <a:p>
             <a:pPr/>
             <a:r>
-              <a:rPr sz="1600"/>
+              <a:rPr sz="1800"/>
               <a:t>Future Enhancements</a:t>
             </a:r>
           </a:p>
           <a:p>
             <a:pPr lvl="1"/>
             <a:r>
-              <a:rPr sz="1400"/>
+              <a:rPr sz="1600"/>
               <a:t>Provider–patient graph relationships</a:t>
             </a:r>
           </a:p>
           <a:p>
             <a:pPr lvl="1"/>
             <a:r>
-              <a:rPr sz="1400"/>
+              <a:rPr sz="1600"/>
               <a:t>Temporal fraud drift tracking</a:t>
             </a:r>
           </a:p>
@@ -3588,10 +3603,15 @@
           <a:lstStyle/>
           <a:p>
             <a:pPr>
-              <a:defRPr sz="2800"/>
+              <a:defRPr sz="3200"/>
             </a:pPr>
             <a:r>
               <a:t>Slide 12 — Key Drivers of Risk</a:t>
+            </a:r>
+          </a:p>
+          <a:p>
+            <a:r>
+              <a:t>By Malak</a:t>
             </a:r>
           </a:p>
         </p:txBody>
@@ -3615,35 +3635,35 @@
           <a:p>
             <a:pPr/>
             <a:r>
-              <a:rPr sz="1600"/>
+              <a:rPr sz="1800"/>
               <a:t>Top influential signals:</a:t>
             </a:r>
           </a:p>
           <a:p>
             <a:pPr lvl="1"/>
             <a:r>
-              <a:rPr sz="1400"/>
+              <a:rPr sz="1600"/>
               <a:t>Total claims submitted</a:t>
             </a:r>
           </a:p>
           <a:p>
             <a:pPr lvl="1"/>
             <a:r>
-              <a:rPr sz="1400"/>
+              <a:rPr sz="1600"/>
               <a:t>Total &amp; avg reimbursement</a:t>
             </a:r>
           </a:p>
           <a:p>
             <a:pPr lvl="1"/>
             <a:r>
-              <a:rPr sz="1400"/>
+              <a:rPr sz="1600"/>
               <a:t>Diagnosis &amp; procedure diversity</a:t>
             </a:r>
           </a:p>
           <a:p>
             <a:pPr lvl="1"/>
             <a:r>
-              <a:rPr sz="1400"/>
+              <a:rPr sz="1600"/>
               <a:t>Chronic illness ratios</a:t>
             </a:r>
           </a:p>
@@ -3653,7 +3673,7 @@
           <a:p>
             <a:pPr/>
             <a:r>
-              <a:rPr sz="1600"/>
+              <a:rPr sz="1800"/>
               <a:t>➡️ Features align with known real-world fraud behaviors</a:t>
             </a:r>
           </a:p>
@@ -3699,6 +3719,11 @@
               <a:t>Slide 13 — Final Recommendations</a:t>
             </a:r>
           </a:p>
+          <a:p>
+            <a:r>
+              <a:t>By Mohamed</a:t>
+            </a:r>
+          </a:p>
         </p:txBody>
       </p:sp>
       <p:sp>
@@ -3720,28 +3745,28 @@
           <a:p>
             <a:pPr/>
             <a:r>
-              <a:rPr sz="1800"/>
+              <a:rPr sz="2000"/>
               <a:t>Deploy XGBoost for Medicare fraud triage</a:t>
             </a:r>
           </a:p>
           <a:p>
             <a:pPr/>
             <a:r>
-              <a:rPr sz="1800"/>
+              <a:rPr sz="2000"/>
               <a:t>Investigate top risk percentile providers</a:t>
             </a:r>
           </a:p>
           <a:p>
             <a:pPr/>
             <a:r>
-              <a:rPr sz="1800"/>
+              <a:rPr sz="2000"/>
               <a:t>Keep human analysts in loop</a:t>
             </a:r>
           </a:p>
           <a:p>
             <a:pPr/>
             <a:r>
-              <a:rPr sz="1800"/>
+              <a:rPr sz="2000"/>
               <a:t>Retrain every quarter → prevent drift</a:t>
             </a:r>
           </a:p>
@@ -3846,15 +3871,10 @@
           <a:lstStyle/>
           <a:p>
             <a:pPr>
-              <a:defRPr sz="2800"/>
+              <a:defRPr sz="3200"/>
             </a:pPr>
             <a:r>
               <a:t>Slide 1 — The Problem &amp; Our Objective</a:t>
-            </a:r>
-          </a:p>
-          <a:p>
-            <a:r>
-              <a:t>By Mohamed</a:t>
             </a:r>
           </a:p>
         </p:txBody>
@@ -3878,21 +3898,21 @@
           <a:p>
             <a:pPr/>
             <a:r>
-              <a:rPr sz="1600"/>
+              <a:rPr sz="1800"/>
               <a:t>US healthcare fraud exceeds $68B/year</a:t>
             </a:r>
           </a:p>
           <a:p>
             <a:pPr/>
             <a:r>
-              <a:rPr sz="1600"/>
+              <a:rPr sz="1800"/>
               <a:t>Legacy auditing misses hidden fraud patterns</a:t>
             </a:r>
           </a:p>
           <a:p>
             <a:pPr/>
             <a:r>
-              <a:rPr sz="1600"/>
+              <a:rPr sz="1800"/>
               <a:t>Fraudulent providers ≈ 9% → ML bias</a:t>
             </a:r>
           </a:p>
@@ -3902,28 +3922,28 @@
           <a:p>
             <a:pPr/>
             <a:r>
-              <a:rPr sz="1600"/>
+              <a:rPr sz="1800"/>
               <a:t>Goal</a:t>
             </a:r>
           </a:p>
           <a:p>
             <a:pPr lvl="1"/>
             <a:r>
-              <a:rPr sz="1400"/>
+              <a:rPr sz="1600"/>
               <a:t>Detect high-risk providers (not individual claims)</a:t>
             </a:r>
           </a:p>
           <a:p>
             <a:pPr lvl="1"/>
             <a:r>
-              <a:rPr sz="1400"/>
+              <a:rPr sz="1600"/>
               <a:t>Handle severe class imbalance</a:t>
             </a:r>
           </a:p>
           <a:p>
             <a:pPr lvl="1"/>
             <a:r>
-              <a:rPr sz="1400"/>
+              <a:rPr sz="1600"/>
               <a:t>Reduce false investigations &amp; financial loss</a:t>
             </a:r>
           </a:p>
@@ -3969,6 +3989,11 @@
               <a:t>Slide 2 — Data Architecture Overview (Phase 1)</a:t>
             </a:r>
           </a:p>
+          <a:p>
+            <a:r>
+              <a:t>By Malak</a:t>
+            </a:r>
+          </a:p>
         </p:txBody>
       </p:sp>
       <p:sp>
@@ -3990,35 +4015,35 @@
           <a:p>
             <a:pPr/>
             <a:r>
-              <a:rPr sz="1600"/>
+              <a:rPr sz="1800"/>
               <a:t>Inputs</a:t>
             </a:r>
           </a:p>
           <a:p>
             <a:pPr lvl="1"/>
             <a:r>
-              <a:rPr sz="1400"/>
+              <a:rPr sz="1600"/>
               <a:t>Beneficiary</a:t>
             </a:r>
           </a:p>
           <a:p>
             <a:pPr lvl="1"/>
             <a:r>
-              <a:rPr sz="1400"/>
+              <a:rPr sz="1600"/>
               <a:t>Inpatient</a:t>
             </a:r>
           </a:p>
           <a:p>
             <a:pPr lvl="1"/>
             <a:r>
-              <a:rPr sz="1400"/>
+              <a:rPr sz="1600"/>
               <a:t>Outpatient</a:t>
             </a:r>
           </a:p>
           <a:p>
             <a:pPr lvl="1"/>
             <a:r>
-              <a:rPr sz="1400"/>
+              <a:rPr sz="1600"/>
               <a:t>Provider labels</a:t>
             </a:r>
           </a:p>
@@ -4028,21 +4053,21 @@
           <a:p>
             <a:pPr/>
             <a:r>
-              <a:rPr sz="1600"/>
+              <a:rPr sz="1800"/>
               <a:t>Join Level</a:t>
             </a:r>
           </a:p>
           <a:p>
             <a:pPr lvl="1"/>
             <a:r>
-              <a:rPr sz="1400"/>
+              <a:rPr sz="1600"/>
               <a:t>BeneID → Patient Events</a:t>
             </a:r>
           </a:p>
           <a:p>
             <a:pPr lvl="1"/>
             <a:r>
-              <a:rPr sz="1400"/>
+              <a:rPr sz="1600"/>
               <a:t>Provider → Target Entity (Fraud label)</a:t>
             </a:r>
           </a:p>
@@ -4052,21 +4077,21 @@
           <a:p>
             <a:pPr/>
             <a:r>
-              <a:rPr sz="1600"/>
+              <a:rPr sz="1800"/>
               <a:t>Challenge</a:t>
             </a:r>
           </a:p>
           <a:p>
             <a:pPr lvl="1"/>
             <a:r>
-              <a:rPr sz="1400"/>
+              <a:rPr sz="1600"/>
               <a:t>Claims are transactional</a:t>
             </a:r>
           </a:p>
           <a:p>
             <a:pPr lvl="1"/>
             <a:r>
-              <a:rPr sz="1400"/>
+              <a:rPr sz="1600"/>
               <a:t>Fraud is behavioral at provider level</a:t>
             </a:r>
           </a:p>
@@ -4076,7 +4101,7 @@
           <a:p>
             <a:pPr/>
             <a:r>
-              <a:rPr sz="1600"/>
+              <a:rPr sz="1800"/>
               <a:t>➡️ Build provider-level profiles</a:t>
             </a:r>
           </a:p>
@@ -4116,10 +4141,15 @@
           <a:lstStyle/>
           <a:p>
             <a:pPr>
-              <a:defRPr sz="2800"/>
+              <a:defRPr sz="3200"/>
             </a:pPr>
             <a:r>
               <a:t>Slide 3 — Data Cleaning Strategy</a:t>
+            </a:r>
+          </a:p>
+          <a:p>
+            <a:r>
+              <a:t>By Malak</a:t>
             </a:r>
           </a:p>
         </p:txBody>
@@ -4143,28 +4173,28 @@
           <a:p>
             <a:pPr/>
             <a:r>
-              <a:rPr sz="1600"/>
+              <a:rPr sz="1800"/>
               <a:t>Problems Detected</a:t>
             </a:r>
           </a:p>
           <a:p>
             <a:pPr lvl="1"/>
             <a:r>
-              <a:rPr sz="1400"/>
+              <a:rPr sz="1600"/>
               <a:t>Missing physician codes</a:t>
             </a:r>
           </a:p>
           <a:p>
             <a:pPr lvl="1"/>
             <a:r>
-              <a:rPr sz="1400"/>
+              <a:rPr sz="1600"/>
               <a:t>Nonsensical claim durations</a:t>
             </a:r>
           </a:p>
           <a:p>
             <a:pPr lvl="1"/>
             <a:r>
-              <a:rPr sz="1400"/>
+              <a:rPr sz="1600"/>
               <a:t>Zero-information columns</a:t>
             </a:r>
           </a:p>
@@ -4174,28 +4204,28 @@
           <a:p>
             <a:pPr/>
             <a:r>
-              <a:rPr sz="1600"/>
+              <a:rPr sz="1800"/>
               <a:t>Actions</a:t>
             </a:r>
           </a:p>
           <a:p>
             <a:pPr lvl="1"/>
             <a:r>
-              <a:rPr sz="1400"/>
+              <a:rPr sz="1600"/>
               <a:t>Encode missing physicians as "Unknown"</a:t>
             </a:r>
           </a:p>
           <a:p>
             <a:pPr lvl="1"/>
             <a:r>
-              <a:rPr sz="1400"/>
+              <a:rPr sz="1600"/>
               <a:t>Drop invalid-duration claims</a:t>
             </a:r>
           </a:p>
           <a:p>
             <a:pPr lvl="1"/>
             <a:r>
-              <a:rPr sz="1400"/>
+              <a:rPr sz="1600"/>
               <a:t>Remove redundant fields</a:t>
             </a:r>
           </a:p>
@@ -4205,14 +4235,14 @@
           <a:p>
             <a:pPr/>
             <a:r>
-              <a:rPr sz="1600"/>
+              <a:rPr sz="1800"/>
               <a:t>Outcome</a:t>
             </a:r>
           </a:p>
           <a:p>
             <a:pPr lvl="1"/>
             <a:r>
-              <a:rPr sz="1400"/>
+              <a:rPr sz="1600"/>
               <a:t>Fraud distribution confirmed at ~9–10%</a:t>
             </a:r>
           </a:p>
@@ -4252,10 +4282,15 @@
           <a:lstStyle/>
           <a:p>
             <a:pPr>
-              <a:defRPr sz="2800"/>
+              <a:defRPr sz="3200"/>
             </a:pPr>
             <a:r>
               <a:t>Slide 4 — Feature Engineering</a:t>
+            </a:r>
+          </a:p>
+          <a:p>
+            <a:r>
+              <a:t>By Mohamed</a:t>
             </a:r>
           </a:p>
         </p:txBody>
@@ -4279,7 +4314,7 @@
           <a:p>
             <a:pPr/>
             <a:r>
-              <a:rPr sz="1600"/>
+              <a:rPr sz="1800"/>
               <a:t>We convert millions of claims → provider behavioral vectors</a:t>
             </a:r>
           </a:p>
@@ -4289,35 +4324,35 @@
           <a:p>
             <a:pPr/>
             <a:r>
-              <a:rPr sz="1600"/>
+              <a:rPr sz="1800"/>
               <a:t>Feature Groups</a:t>
             </a:r>
           </a:p>
           <a:p>
             <a:pPr lvl="1"/>
             <a:r>
-              <a:rPr sz="1400"/>
+              <a:rPr sz="1600"/>
               <a:t>Financial: reimbursements, avg deductible, mean claim cost</a:t>
             </a:r>
           </a:p>
           <a:p>
             <a:pPr lvl="1"/>
             <a:r>
-              <a:rPr sz="1400"/>
+              <a:rPr sz="1600"/>
               <a:t>Operational: volume, inpatient/outpatient balance</a:t>
             </a:r>
           </a:p>
           <a:p>
             <a:pPr lvl="1"/>
             <a:r>
-              <a:rPr sz="1400"/>
+              <a:rPr sz="1600"/>
               <a:t>Service Diversity: unique diagnoses &amp; procedures</a:t>
             </a:r>
           </a:p>
           <a:p>
             <a:pPr lvl="1"/>
             <a:r>
-              <a:rPr sz="1400"/>
+              <a:rPr sz="1600"/>
               <a:t>Patient mix: chronic ratios, unique patient count</a:t>
             </a:r>
           </a:p>
@@ -4327,7 +4362,7 @@
           <a:p>
             <a:pPr/>
             <a:r>
-              <a:rPr sz="1600"/>
+              <a:rPr sz="1800"/>
               <a:t>Final Dataset: 5410 providers × ~134 features</a:t>
             </a:r>
           </a:p>
@@ -4367,10 +4402,15 @@
           <a:lstStyle/>
           <a:p>
             <a:pPr>
-              <a:defRPr sz="2800"/>
+              <a:defRPr sz="3200"/>
             </a:pPr>
             <a:r>
               <a:t>Slide 5 — Exploratory Insights</a:t>
+            </a:r>
+          </a:p>
+          <a:p>
+            <a:r>
+              <a:t>By Mohamed</a:t>
             </a:r>
           </a:p>
         </p:txBody>
@@ -4394,35 +4434,35 @@
           <a:p>
             <a:pPr/>
             <a:r>
-              <a:rPr sz="1600"/>
+              <a:rPr sz="1800"/>
               <a:t>Detected patterns:</a:t>
             </a:r>
           </a:p>
           <a:p>
             <a:pPr lvl="1"/>
             <a:r>
-              <a:rPr sz="1400"/>
+              <a:rPr sz="1600"/>
               <a:t>Fraud providers show higher revenue throughput</a:t>
             </a:r>
           </a:p>
           <a:p>
             <a:pPr lvl="1"/>
             <a:r>
-              <a:rPr sz="1400"/>
+              <a:rPr sz="1600"/>
               <a:t>Greater diagnosis/procedure diversity</a:t>
             </a:r>
           </a:p>
           <a:p>
             <a:pPr lvl="1"/>
             <a:r>
-              <a:rPr sz="1400"/>
+              <a:rPr sz="1600"/>
               <a:t>Geographic hotspots (certain states)</a:t>
             </a:r>
           </a:p>
           <a:p>
             <a:pPr lvl="1"/>
             <a:r>
-              <a:rPr sz="1400"/>
+              <a:rPr sz="1600"/>
               <a:t>Sustained high billing across time → not random</a:t>
             </a:r>
           </a:p>
@@ -4468,6 +4508,11 @@
               <a:t>Slide 6 — Handling Imbalance (Phase 2)</a:t>
             </a:r>
           </a:p>
+          <a:p>
+            <a:r>
+              <a:t>By Bahy</a:t>
+            </a:r>
+          </a:p>
         </p:txBody>
       </p:sp>
       <p:sp>
@@ -4489,7 +4534,7 @@
           <a:p>
             <a:pPr/>
             <a:r>
-              <a:rPr sz="1600"/>
+              <a:rPr sz="1800"/>
               <a:t>Issue: Fraud = minority → models default to "No Fraud"</a:t>
             </a:r>
           </a:p>
@@ -4499,28 +4544,28 @@
           <a:p>
             <a:pPr/>
             <a:r>
-              <a:rPr sz="1600"/>
+              <a:rPr sz="1800"/>
               <a:t>Methods tested:</a:t>
             </a:r>
           </a:p>
           <a:p>
             <a:pPr lvl="1"/>
             <a:r>
-              <a:rPr sz="1400"/>
+              <a:rPr sz="1600"/>
               <a:t>Class Weighting</a:t>
             </a:r>
           </a:p>
           <a:p>
             <a:pPr lvl="1"/>
             <a:r>
-              <a:rPr sz="1400"/>
+              <a:rPr sz="1600"/>
               <a:t>SMOTE</a:t>
             </a:r>
           </a:p>
           <a:p>
             <a:pPr lvl="1"/>
             <a:r>
-              <a:rPr sz="1400"/>
+              <a:rPr sz="1600"/>
               <a:t>SMOTE + Tomek Links</a:t>
             </a:r>
           </a:p>
@@ -4530,21 +4575,21 @@
           <a:p>
             <a:pPr/>
             <a:r>
-              <a:rPr sz="1600"/>
+              <a:rPr sz="1800"/>
               <a:t>Purpose:</a:t>
             </a:r>
           </a:p>
           <a:p>
             <a:pPr lvl="1"/>
             <a:r>
-              <a:rPr sz="1400"/>
+              <a:rPr sz="1600"/>
               <a:t>Improve detection power</a:t>
             </a:r>
           </a:p>
           <a:p>
             <a:pPr lvl="1"/>
             <a:r>
-              <a:rPr sz="1400"/>
+              <a:rPr sz="1600"/>
               <a:t>Preserve real distributions after oversampling</a:t>
             </a:r>
           </a:p>
@@ -4590,6 +4635,11 @@
               <a:t>Slide 7 — Modeling Strategy (Phase 3)</a:t>
             </a:r>
           </a:p>
+          <a:p>
+            <a:r>
+              <a:t>By Bahy</a:t>
+            </a:r>
+          </a:p>
         </p:txBody>
       </p:sp>
       <p:sp>
@@ -4611,35 +4661,35 @@
           <a:p>
             <a:pPr/>
             <a:r>
-              <a:rPr sz="1600"/>
+              <a:rPr sz="1800"/>
               <a:t>Models:</a:t>
             </a:r>
           </a:p>
           <a:p>
             <a:pPr lvl="1"/>
             <a:r>
-              <a:rPr sz="1400"/>
+              <a:rPr sz="1600"/>
               <a:t>Logistic Regression → interpretable baseline</a:t>
             </a:r>
           </a:p>
           <a:p>
             <a:pPr lvl="1"/>
             <a:r>
-              <a:rPr sz="1400"/>
+              <a:rPr sz="1600"/>
               <a:t>Decision Tree → simple benchmark</a:t>
             </a:r>
           </a:p>
           <a:p>
             <a:pPr lvl="1"/>
             <a:r>
-              <a:rPr sz="1400"/>
+              <a:rPr sz="1600"/>
               <a:t>Random Forest → robust ensemble</a:t>
             </a:r>
           </a:p>
           <a:p>
             <a:pPr lvl="1"/>
             <a:r>
-              <a:rPr sz="1400"/>
+              <a:rPr sz="1600"/>
               <a:t>XGBoost → non-linear excellence + imbalance tolerance</a:t>
             </a:r>
           </a:p>
@@ -4649,21 +4699,21 @@
           <a:p>
             <a:pPr/>
             <a:r>
-              <a:rPr sz="1600"/>
+              <a:rPr sz="1800"/>
               <a:t>Tuning</a:t>
             </a:r>
           </a:p>
           <a:p>
             <a:pPr lvl="1"/>
             <a:r>
-              <a:rPr sz="1400"/>
+              <a:rPr sz="1600"/>
               <a:t>GridSearchCV (5-fold)</a:t>
             </a:r>
           </a:p>
           <a:p>
             <a:pPr lvl="1"/>
             <a:r>
-              <a:rPr sz="1400"/>
+              <a:rPr sz="1600"/>
               <a:t>Optimized for F1 score</a:t>
             </a:r>
           </a:p>
@@ -4709,6 +4759,11 @@
               <a:t>Slide 8 — Model Selection Results</a:t>
             </a:r>
           </a:p>
+          <a:p>
+            <a:r>
+              <a:t>By Mohamed</a:t>
+            </a:r>
+          </a:p>
         </p:txBody>
       </p:sp>
       <p:sp>
@@ -4730,7 +4785,7 @@
           <a:p>
             <a:pPr/>
             <a:r>
-              <a:rPr sz="1400"/>
+              <a:rPr sz="1600"/>
               <a:t>Model Comparison (Validation Set):</a:t>
             </a:r>
           </a:p>
@@ -4740,28 +4795,28 @@
           <a:p>
             <a:pPr/>
             <a:r>
-              <a:rPr sz="1400"/>
+              <a:rPr sz="1600"/>
               <a:t>Logistic Regression: Precision 0.43, Recall 0.80, F1 0.56, PR-AUC 0.63</a:t>
             </a:r>
           </a:p>
           <a:p>
             <a:pPr/>
             <a:r>
-              <a:rPr sz="1400"/>
+              <a:rPr sz="1600"/>
               <a:t>Random Forest: Precision 0.48, Recall 0.77, F1 0.59, PR-AUC 0.59</a:t>
             </a:r>
           </a:p>
           <a:p>
             <a:pPr/>
             <a:r>
-              <a:rPr sz="1400"/>
+              <a:rPr sz="1600"/>
               <a:t>Decision Tree: Precision 0.43, Recall 0.68, F1 0.53, PR-AUC 0.37</a:t>
             </a:r>
           </a:p>
           <a:p>
             <a:pPr/>
             <a:r>
-              <a:rPr sz="1400"/>
+              <a:rPr sz="1600"/>
               <a:t>XGBoost: Precision 0.59, Recall 0.68, F1 0.63, PR-AUC 0.65</a:t>
             </a:r>
           </a:p>
@@ -4771,7 +4826,7 @@
           <a:p>
             <a:pPr/>
             <a:r>
-              <a:rPr sz="1400"/>
+              <a:rPr sz="1600"/>
               <a:t>XGBoost = best balance: recall + precision + ROC-AUC</a:t>
             </a:r>
           </a:p>

</xml_diff>

<commit_message>
removed the names from the slides
</commit_message>
<xml_diff>
--- a/reports/presentation.pptx
+++ b/reports/presentation.pptx
@@ -3196,11 +3196,6 @@
               <a:t>Slide 9 — Final Test Evaluation (Phase 4)</a:t>
             </a:r>
           </a:p>
-          <a:p>
-            <a:r>
-              <a:t>By Aly</a:t>
-            </a:r>
-          </a:p>
         </p:txBody>
       </p:sp>
       <p:sp>
@@ -3358,11 +3353,6 @@
               <a:t>Slide 10 — Business Impact</a:t>
             </a:r>
           </a:p>
-          <a:p>
-            <a:r>
-              <a:t>By Mohamed</a:t>
-            </a:r>
-          </a:p>
         </p:txBody>
       </p:sp>
       <p:sp>
@@ -3475,11 +3465,6 @@
               <a:t>Slide 11 — Error Analysis</a:t>
             </a:r>
           </a:p>
-          <a:p>
-            <a:r>
-              <a:t>By Bahy</a:t>
-            </a:r>
-          </a:p>
         </p:txBody>
       </p:sp>
       <p:sp>
@@ -3609,11 +3594,6 @@
               <a:t>Slide 12 — Key Drivers of Risk</a:t>
             </a:r>
           </a:p>
-          <a:p>
-            <a:r>
-              <a:t>By Malak</a:t>
-            </a:r>
-          </a:p>
         </p:txBody>
       </p:sp>
       <p:sp>
@@ -3719,11 +3699,6 @@
               <a:t>Slide 13 — Final Recommendations</a:t>
             </a:r>
           </a:p>
-          <a:p>
-            <a:r>
-              <a:t>By Mohamed</a:t>
-            </a:r>
-          </a:p>
         </p:txBody>
       </p:sp>
       <p:sp>
@@ -3989,11 +3964,6 @@
               <a:t>Slide 2 — Data Architecture Overview (Phase 1)</a:t>
             </a:r>
           </a:p>
-          <a:p>
-            <a:r>
-              <a:t>By Malak</a:t>
-            </a:r>
-          </a:p>
         </p:txBody>
       </p:sp>
       <p:sp>
@@ -4147,11 +4117,6 @@
               <a:t>Slide 3 — Data Cleaning Strategy</a:t>
             </a:r>
           </a:p>
-          <a:p>
-            <a:r>
-              <a:t>By Malak</a:t>
-            </a:r>
-          </a:p>
         </p:txBody>
       </p:sp>
       <p:sp>
@@ -4288,11 +4253,6 @@
               <a:t>Slide 4 — Feature Engineering</a:t>
             </a:r>
           </a:p>
-          <a:p>
-            <a:r>
-              <a:t>By Mohamed</a:t>
-            </a:r>
-          </a:p>
         </p:txBody>
       </p:sp>
       <p:sp>
@@ -4408,11 +4368,6 @@
               <a:t>Slide 5 — Exploratory Insights</a:t>
             </a:r>
           </a:p>
-          <a:p>
-            <a:r>
-              <a:t>By Mohamed</a:t>
-            </a:r>
-          </a:p>
         </p:txBody>
       </p:sp>
       <p:sp>
@@ -4508,11 +4463,6 @@
               <a:t>Slide 6 — Handling Imbalance (Phase 2)</a:t>
             </a:r>
           </a:p>
-          <a:p>
-            <a:r>
-              <a:t>By Bahy</a:t>
-            </a:r>
-          </a:p>
         </p:txBody>
       </p:sp>
       <p:sp>
@@ -4635,11 +4585,6 @@
               <a:t>Slide 7 — Modeling Strategy (Phase 3)</a:t>
             </a:r>
           </a:p>
-          <a:p>
-            <a:r>
-              <a:t>By Bahy</a:t>
-            </a:r>
-          </a:p>
         </p:txBody>
       </p:sp>
       <p:sp>
@@ -4757,11 +4702,6 @@
             </a:pPr>
             <a:r>
               <a:t>Slide 8 — Model Selection Results</a:t>
-            </a:r>
-          </a:p>
-          <a:p>
-            <a:r>
-              <a:t>By Mohamed</a:t>
             </a:r>
           </a:p>
         </p:txBody>

</xml_diff>

<commit_message>
removed the names from every slide
</commit_message>
<xml_diff>
--- a/reports/presentation.pptx
+++ b/reports/presentation.pptx
@@ -3189,9 +3189,6 @@
           <a:bodyPr/>
           <a:lstStyle/>
           <a:p>
-            <a:pPr>
-              <a:defRPr sz="2800"/>
-            </a:pPr>
             <a:r>
               <a:t>Slide 9 — Final Test Evaluation (Phase 4)</a:t>
             </a:r>
@@ -3346,9 +3343,6 @@
           <a:bodyPr/>
           <a:lstStyle/>
           <a:p>
-            <a:pPr>
-              <a:defRPr sz="3200"/>
-            </a:pPr>
             <a:r>
               <a:t>Slide 10 — Business Impact</a:t>
             </a:r>
@@ -3458,9 +3452,6 @@
           <a:bodyPr/>
           <a:lstStyle/>
           <a:p>
-            <a:pPr>
-              <a:defRPr sz="3200"/>
-            </a:pPr>
             <a:r>
               <a:t>Slide 11 — Error Analysis</a:t>
             </a:r>
@@ -3587,9 +3578,6 @@
           <a:bodyPr/>
           <a:lstStyle/>
           <a:p>
-            <a:pPr>
-              <a:defRPr sz="3200"/>
-            </a:pPr>
             <a:r>
               <a:t>Slide 12 — Key Drivers of Risk</a:t>
             </a:r>
@@ -3692,9 +3680,6 @@
           <a:bodyPr/>
           <a:lstStyle/>
           <a:p>
-            <a:pPr>
-              <a:defRPr sz="2800"/>
-            </a:pPr>
             <a:r>
               <a:t>Slide 13 — Final Recommendations</a:t>
             </a:r>
@@ -3845,9 +3830,6 @@
           <a:bodyPr/>
           <a:lstStyle/>
           <a:p>
-            <a:pPr>
-              <a:defRPr sz="3200"/>
-            </a:pPr>
             <a:r>
               <a:t>Slide 1 — The Problem &amp; Our Objective</a:t>
             </a:r>
@@ -3957,9 +3939,6 @@
           <a:bodyPr/>
           <a:lstStyle/>
           <a:p>
-            <a:pPr>
-              <a:defRPr sz="2800"/>
-            </a:pPr>
             <a:r>
               <a:t>Slide 2 — Data Architecture Overview (Phase 1)</a:t>
             </a:r>
@@ -4110,9 +4089,6 @@
           <a:bodyPr/>
           <a:lstStyle/>
           <a:p>
-            <a:pPr>
-              <a:defRPr sz="3200"/>
-            </a:pPr>
             <a:r>
               <a:t>Slide 3 — Data Cleaning Strategy</a:t>
             </a:r>
@@ -4246,9 +4222,6 @@
           <a:bodyPr/>
           <a:lstStyle/>
           <a:p>
-            <a:pPr>
-              <a:defRPr sz="3200"/>
-            </a:pPr>
             <a:r>
               <a:t>Slide 4 — Feature Engineering</a:t>
             </a:r>
@@ -4361,9 +4334,6 @@
           <a:bodyPr/>
           <a:lstStyle/>
           <a:p>
-            <a:pPr>
-              <a:defRPr sz="3200"/>
-            </a:pPr>
             <a:r>
               <a:t>Slide 5 — Exploratory Insights</a:t>
             </a:r>
@@ -4456,9 +4426,6 @@
           <a:bodyPr/>
           <a:lstStyle/>
           <a:p>
-            <a:pPr>
-              <a:defRPr sz="2800"/>
-            </a:pPr>
             <a:r>
               <a:t>Slide 6 — Handling Imbalance (Phase 2)</a:t>
             </a:r>
@@ -4578,9 +4545,6 @@
           <a:bodyPr/>
           <a:lstStyle/>
           <a:p>
-            <a:pPr>
-              <a:defRPr sz="2800"/>
-            </a:pPr>
             <a:r>
               <a:t>Slide 7 — Modeling Strategy (Phase 3)</a:t>
             </a:r>
@@ -4697,9 +4661,6 @@
           <a:bodyPr/>
           <a:lstStyle/>
           <a:p>
-            <a:pPr>
-              <a:defRPr sz="2800"/>
-            </a:pPr>
             <a:r>
               <a:t>Slide 8 — Model Selection Results</a:t>
             </a:r>

</xml_diff>